<commit_message>
fix(template): use calibri for englsh font
</commit_message>
<xml_diff>
--- a/api/template/responsive_reading.pptx
+++ b/api/template/responsive_reading.pptx
@@ -288,7 +288,7 @@
                 <a:cs typeface="+mn-cs"/>
               </a:rPr>
               <a:pPr algn="l" rtl="0"/>
-              <a:t>3/2/2025</a:t>
+              <a:t>8/22/25</a:t>
             </a:fld>
             <a:endParaRPr lang="en-US" sz="1200" kern="1200">
               <a:solidFill>
@@ -535,7 +535,7 @@
                 <a:cs typeface="+mn-cs"/>
               </a:rPr>
               <a:pPr algn="l" rtl="0"/>
-              <a:t>3/2/2025</a:t>
+              <a:t>8/22/25</a:t>
             </a:fld>
             <a:endParaRPr lang="en-US" sz="1200" kern="1200">
               <a:solidFill>
@@ -763,7 +763,7 @@
                 <a:cs typeface="+mn-cs"/>
               </a:rPr>
               <a:pPr algn="l" rtl="0"/>
-              <a:t>3/2/2025</a:t>
+              <a:t>8/22/25</a:t>
             </a:fld>
             <a:endParaRPr lang="en-US" sz="1200" kern="1200">
               <a:solidFill>
@@ -981,7 +981,7 @@
                 <a:cs typeface="+mn-cs"/>
               </a:rPr>
               <a:pPr algn="l" rtl="0"/>
-              <a:t>3/2/2025</a:t>
+              <a:t>8/22/25</a:t>
             </a:fld>
             <a:endParaRPr lang="en-US" sz="1200" kern="1200">
               <a:solidFill>
@@ -1276,7 +1276,7 @@
                 <a:cs typeface="+mn-cs"/>
               </a:rPr>
               <a:pPr algn="l" rtl="0"/>
-              <a:t>3/2/2025</a:t>
+              <a:t>8/22/25</a:t>
             </a:fld>
             <a:endParaRPr lang="en-US" sz="1200" kern="1200">
               <a:solidFill>
@@ -1611,7 +1611,7 @@
                 <a:cs typeface="+mn-cs"/>
               </a:rPr>
               <a:pPr algn="l" rtl="0"/>
-              <a:t>3/2/2025</a:t>
+              <a:t>8/22/25</a:t>
             </a:fld>
             <a:endParaRPr lang="en-US" sz="1200" kern="1200">
               <a:solidFill>
@@ -2080,7 +2080,7 @@
                 <a:cs typeface="+mn-cs"/>
               </a:rPr>
               <a:pPr algn="l" rtl="0"/>
-              <a:t>3/2/2025</a:t>
+              <a:t>8/22/25</a:t>
             </a:fld>
             <a:endParaRPr lang="en-US" sz="1200" kern="1200">
               <a:solidFill>
@@ -2247,7 +2247,7 @@
                 <a:cs typeface="+mn-cs"/>
               </a:rPr>
               <a:pPr algn="l" rtl="0"/>
-              <a:t>3/2/2025</a:t>
+              <a:t>8/22/25</a:t>
             </a:fld>
             <a:endParaRPr lang="en-US" sz="1200" kern="1200">
               <a:solidFill>
@@ -2392,7 +2392,7 @@
                 <a:cs typeface="+mn-cs"/>
               </a:rPr>
               <a:pPr algn="l" rtl="0"/>
-              <a:t>3/2/2025</a:t>
+              <a:t>8/22/25</a:t>
             </a:fld>
             <a:endParaRPr lang="en-US" sz="1200" kern="1200">
               <a:solidFill>
@@ -2717,7 +2717,7 @@
                 <a:cs typeface="+mn-cs"/>
               </a:rPr>
               <a:pPr algn="l" rtl="0"/>
-              <a:t>3/2/2025</a:t>
+              <a:t>8/22/25</a:t>
             </a:fld>
             <a:endParaRPr lang="en-US" sz="1200" kern="1200">
               <a:solidFill>
@@ -3019,7 +3019,7 @@
                 <a:cs typeface="+mn-cs"/>
               </a:rPr>
               <a:pPr algn="l" rtl="0"/>
-              <a:t>3/2/2025</a:t>
+              <a:t>8/22/25</a:t>
             </a:fld>
             <a:endParaRPr lang="en-US" sz="1200" kern="1200">
               <a:solidFill>
@@ -3280,7 +3280,7 @@
                 <a:cs typeface="+mn-cs"/>
               </a:rPr>
               <a:pPr rtl="0"/>
-              <a:t>3/2/2025</a:t>
+              <a:t>8/22/25</a:t>
             </a:fld>
             <a:endParaRPr lang="en-US" kern="1200">
               <a:solidFill>
@@ -3955,7 +3955,7 @@
         <p:spPr>
           <a:xfrm>
             <a:off x="240145" y="261871"/>
-            <a:ext cx="11717552" cy="3785652"/>
+            <a:ext cx="11717552" cy="3600986"/>
           </a:xfrm>
           <a:prstGeom prst="rect">
             <a:avLst/>
@@ -4010,16 +4010,46 @@
               </a:spcAft>
             </a:pPr>
             <a:r>
-              <a:rPr lang="en-US" sz="4000" b="1" dirty="0">
+              <a:rPr lang="en-US" sz="3200" b="1" dirty="0">
                 <a:solidFill>
                   <a:srgbClr val="FFFFFF"/>
                 </a:solidFill>
-                <a:latin typeface="KaiTi" panose="02010609060101010101" pitchFamily="49" charset="-122"/>
+                <a:latin typeface="Calibri" panose="020F0502020204030204" pitchFamily="34" charset="0"/>
                 <a:ea typeface="KaiTi" panose="02010609060101010101" pitchFamily="49" charset="-122"/>
-                <a:cs typeface="Arial" panose="020B0604020202020204" pitchFamily="34" charset="0"/>
+                <a:cs typeface="Calibri" panose="020F0502020204030204" pitchFamily="34" charset="0"/>
               </a:rPr>
-              <a:t>@eng_open@ </a:t>
-            </a:r>
+              <a:t>@</a:t>
+            </a:r>
+            <a:r>
+              <a:rPr lang="en-US" sz="3200" b="1" dirty="0" err="1">
+                <a:solidFill>
+                  <a:srgbClr val="FFFFFF"/>
+                </a:solidFill>
+                <a:latin typeface="Calibri" panose="020F0502020204030204" pitchFamily="34" charset="0"/>
+                <a:ea typeface="KaiTi" panose="02010609060101010101" pitchFamily="49" charset="-122"/>
+                <a:cs typeface="Calibri" panose="020F0502020204030204" pitchFamily="34" charset="0"/>
+              </a:rPr>
+              <a:t>eng_open</a:t>
+            </a:r>
+            <a:r>
+              <a:rPr lang="en-US" sz="3200" b="1" dirty="0">
+                <a:solidFill>
+                  <a:srgbClr val="FFFFFF"/>
+                </a:solidFill>
+                <a:latin typeface="Calibri" panose="020F0502020204030204" pitchFamily="34" charset="0"/>
+                <a:ea typeface="KaiTi" panose="02010609060101010101" pitchFamily="49" charset="-122"/>
+                <a:cs typeface="Calibri" panose="020F0502020204030204" pitchFamily="34" charset="0"/>
+              </a:rPr>
+              <a:t>@</a:t>
+            </a:r>
+            <a:endParaRPr lang="en-US" sz="4000" b="1" dirty="0">
+              <a:solidFill>
+                <a:srgbClr val="FFFFFF"/>
+              </a:solidFill>
+              <a:latin typeface="Calibri" panose="020F0502020204030204" pitchFamily="34" charset="0"/>
+              <a:ea typeface="KaiTi" panose="02010609060101010101" pitchFamily="49" charset="-122"/>
+              <a:cs typeface="Calibri" panose="020F0502020204030204" pitchFamily="34" charset="0"/>
+            </a:endParaRPr>
           </a:p>
           <a:p>
             <a:pPr rtl="0">
@@ -4095,20 +4125,20 @@
               </a:spcAft>
             </a:pPr>
             <a:r>
-              <a:rPr lang="en-US" sz="4000" b="1" dirty="0">
+              <a:rPr lang="en-US" sz="3200" b="1" dirty="0">
                 <a:solidFill>
                   <a:srgbClr val="FFFF00"/>
                 </a:solidFill>
-                <a:latin typeface="KaiTi" panose="02010609060101010101" pitchFamily="49" charset="-122"/>
+                <a:latin typeface="Calibri" panose="020F0502020204030204" pitchFamily="34" charset="0"/>
                 <a:ea typeface="KaiTi" panose="02010609060101010101" pitchFamily="49" charset="-122"/>
-                <a:cs typeface="Arial" panose="020B0604020202020204" pitchFamily="34" charset="0"/>
+                <a:cs typeface="Calibri" panose="020F0502020204030204" pitchFamily="34" charset="0"/>
               </a:rPr>
               <a:t>@eng_close@</a:t>
             </a:r>
-            <a:endParaRPr lang="en-MY" sz="4000" b="1" dirty="0">
-              <a:latin typeface="KaiTi" panose="02010609060101010101" pitchFamily="49" charset="-122"/>
+            <a:endParaRPr lang="en-MY" sz="3200" b="1" dirty="0">
+              <a:latin typeface="Calibri" panose="020F0502020204030204" pitchFamily="34" charset="0"/>
               <a:ea typeface="KaiTi" panose="02010609060101010101" pitchFamily="49" charset="-122"/>
-              <a:cs typeface="Arial" panose="020B0604020202020204" pitchFamily="34" charset="0"/>
+              <a:cs typeface="Calibri" panose="020F0502020204030204" pitchFamily="34" charset="0"/>
             </a:endParaRPr>
           </a:p>
         </p:txBody>
@@ -4207,7 +4237,7 @@
         <p:spPr>
           <a:xfrm>
             <a:off x="240145" y="261871"/>
-            <a:ext cx="11717552" cy="1323439"/>
+            <a:ext cx="11717552" cy="1200329"/>
           </a:xfrm>
           <a:prstGeom prst="rect">
             <a:avLst/>
@@ -4291,7 +4321,7 @@
               <a:defRPr/>
             </a:pPr>
             <a:r>
-              <a:rPr kumimoji="0" lang="en-US" sz="4000" b="1" i="0" u="none" strike="noStrike" kern="1200" cap="none" spc="0" normalizeH="0" baseline="0" noProof="0" dirty="0">
+              <a:rPr kumimoji="0" lang="en-US" sz="3200" b="1" i="0" u="none" strike="noStrike" kern="1200" cap="none" spc="0" normalizeH="0" baseline="0" noProof="0" dirty="0">
                 <a:ln>
                   <a:noFill/>
                 </a:ln>
@@ -4301,13 +4331,13 @@
                 <a:effectLst/>
                 <a:uLnTx/>
                 <a:uFillTx/>
-                <a:latin typeface="KaiTi" panose="02010609060101010101" pitchFamily="49" charset="-122"/>
+                <a:latin typeface="Calibri" panose="020F0502020204030204" pitchFamily="34" charset="0"/>
                 <a:ea typeface="KaiTi" panose="02010609060101010101" pitchFamily="49" charset="-122"/>
-                <a:cs typeface="Arial" panose="020B0604020202020204" pitchFamily="34" charset="0"/>
+                <a:cs typeface="Calibri" panose="020F0502020204030204" pitchFamily="34" charset="0"/>
               </a:rPr>
               <a:t>@eng_close@</a:t>
             </a:r>
-            <a:endParaRPr kumimoji="0" lang="en-MY" sz="4000" b="1" i="0" u="none" strike="noStrike" kern="1200" cap="none" spc="0" normalizeH="0" baseline="0" noProof="0" dirty="0">
+            <a:endParaRPr kumimoji="0" lang="en-MY" sz="3200" b="1" i="0" u="none" strike="noStrike" kern="1200" cap="none" spc="0" normalizeH="0" baseline="0" noProof="0" dirty="0">
               <a:ln>
                 <a:noFill/>
               </a:ln>
@@ -4317,9 +4347,9 @@
               <a:effectLst/>
               <a:uLnTx/>
               <a:uFillTx/>
-              <a:latin typeface="KaiTi" panose="02010609060101010101" pitchFamily="49" charset="-122"/>
+              <a:latin typeface="Calibri" panose="020F0502020204030204" pitchFamily="34" charset="0"/>
               <a:ea typeface="KaiTi" panose="02010609060101010101" pitchFamily="49" charset="-122"/>
-              <a:cs typeface="Arial" panose="020B0604020202020204" pitchFamily="34" charset="0"/>
+              <a:cs typeface="Calibri" panose="020F0502020204030204" pitchFamily="34" charset="0"/>
             </a:endParaRPr>
           </a:p>
         </p:txBody>

</xml_diff>

<commit_message>
fix(template): change style without breaking the template
</commit_message>
<xml_diff>
--- a/api/template/responsive_reading.pptx
+++ b/api/template/responsive_reading.pptx
@@ -288,7 +288,7 @@
                 <a:cs typeface="+mn-cs"/>
               </a:rPr>
               <a:pPr algn="l" rtl="0"/>
-              <a:t>8/22/25</a:t>
+              <a:t>8/23/25</a:t>
             </a:fld>
             <a:endParaRPr lang="en-US" sz="1200" kern="1200">
               <a:solidFill>
@@ -535,7 +535,7 @@
                 <a:cs typeface="+mn-cs"/>
               </a:rPr>
               <a:pPr algn="l" rtl="0"/>
-              <a:t>8/22/25</a:t>
+              <a:t>8/23/25</a:t>
             </a:fld>
             <a:endParaRPr lang="en-US" sz="1200" kern="1200">
               <a:solidFill>
@@ -763,7 +763,7 @@
                 <a:cs typeface="+mn-cs"/>
               </a:rPr>
               <a:pPr algn="l" rtl="0"/>
-              <a:t>8/22/25</a:t>
+              <a:t>8/23/25</a:t>
             </a:fld>
             <a:endParaRPr lang="en-US" sz="1200" kern="1200">
               <a:solidFill>
@@ -981,7 +981,7 @@
                 <a:cs typeface="+mn-cs"/>
               </a:rPr>
               <a:pPr algn="l" rtl="0"/>
-              <a:t>8/22/25</a:t>
+              <a:t>8/23/25</a:t>
             </a:fld>
             <a:endParaRPr lang="en-US" sz="1200" kern="1200">
               <a:solidFill>
@@ -1276,7 +1276,7 @@
                 <a:cs typeface="+mn-cs"/>
               </a:rPr>
               <a:pPr algn="l" rtl="0"/>
-              <a:t>8/22/25</a:t>
+              <a:t>8/23/25</a:t>
             </a:fld>
             <a:endParaRPr lang="en-US" sz="1200" kern="1200">
               <a:solidFill>
@@ -1611,7 +1611,7 @@
                 <a:cs typeface="+mn-cs"/>
               </a:rPr>
               <a:pPr algn="l" rtl="0"/>
-              <a:t>8/22/25</a:t>
+              <a:t>8/23/25</a:t>
             </a:fld>
             <a:endParaRPr lang="en-US" sz="1200" kern="1200">
               <a:solidFill>
@@ -2080,7 +2080,7 @@
                 <a:cs typeface="+mn-cs"/>
               </a:rPr>
               <a:pPr algn="l" rtl="0"/>
-              <a:t>8/22/25</a:t>
+              <a:t>8/23/25</a:t>
             </a:fld>
             <a:endParaRPr lang="en-US" sz="1200" kern="1200">
               <a:solidFill>
@@ -2247,7 +2247,7 @@
                 <a:cs typeface="+mn-cs"/>
               </a:rPr>
               <a:pPr algn="l" rtl="0"/>
-              <a:t>8/22/25</a:t>
+              <a:t>8/23/25</a:t>
             </a:fld>
             <a:endParaRPr lang="en-US" sz="1200" kern="1200">
               <a:solidFill>
@@ -2392,7 +2392,7 @@
                 <a:cs typeface="+mn-cs"/>
               </a:rPr>
               <a:pPr algn="l" rtl="0"/>
-              <a:t>8/22/25</a:t>
+              <a:t>8/23/25</a:t>
             </a:fld>
             <a:endParaRPr lang="en-US" sz="1200" kern="1200">
               <a:solidFill>
@@ -2717,7 +2717,7 @@
                 <a:cs typeface="+mn-cs"/>
               </a:rPr>
               <a:pPr algn="l" rtl="0"/>
-              <a:t>8/22/25</a:t>
+              <a:t>8/23/25</a:t>
             </a:fld>
             <a:endParaRPr lang="en-US" sz="1200" kern="1200">
               <a:solidFill>
@@ -3019,7 +3019,7 @@
                 <a:cs typeface="+mn-cs"/>
               </a:rPr>
               <a:pPr algn="l" rtl="0"/>
-              <a:t>8/22/25</a:t>
+              <a:t>8/23/25</a:t>
             </a:fld>
             <a:endParaRPr lang="en-US" sz="1200" kern="1200">
               <a:solidFill>
@@ -3280,7 +3280,7 @@
                 <a:cs typeface="+mn-cs"/>
               </a:rPr>
               <a:pPr rtl="0"/>
-              <a:t>8/22/25</a:t>
+              <a:t>8/23/25</a:t>
             </a:fld>
             <a:endParaRPr lang="en-US" kern="1200">
               <a:solidFill>
@@ -3955,7 +3955,7 @@
         <p:spPr>
           <a:xfrm>
             <a:off x="240145" y="261871"/>
-            <a:ext cx="11717552" cy="3600986"/>
+            <a:ext cx="11717552" cy="3785652"/>
           </a:xfrm>
           <a:prstGeom prst="rect">
             <a:avLst/>
@@ -4018,38 +4018,19 @@
                 <a:ea typeface="KaiTi" panose="02010609060101010101" pitchFamily="49" charset="-122"/>
                 <a:cs typeface="Calibri" panose="020F0502020204030204" pitchFamily="34" charset="0"/>
               </a:rPr>
-              <a:t>@</a:t>
-            </a:r>
-            <a:r>
-              <a:rPr lang="en-US" sz="3200" b="1" dirty="0" err="1">
+              <a:t>@eng_open@</a:t>
+            </a:r>
+            <a:r>
+              <a:rPr lang="en-US" sz="4000" b="1" dirty="0">
                 <a:solidFill>
                   <a:srgbClr val="FFFFFF"/>
                 </a:solidFill>
-                <a:latin typeface="Calibri" panose="020F0502020204030204" pitchFamily="34" charset="0"/>
+                <a:latin typeface="KaiTi" panose="02010609060101010101" pitchFamily="49" charset="-122"/>
                 <a:ea typeface="KaiTi" panose="02010609060101010101" pitchFamily="49" charset="-122"/>
-                <a:cs typeface="Calibri" panose="020F0502020204030204" pitchFamily="34" charset="0"/>
+                <a:cs typeface="Arial" panose="020B0604020202020204" pitchFamily="34" charset="0"/>
               </a:rPr>
-              <a:t>eng_open</a:t>
-            </a:r>
-            <a:r>
-              <a:rPr lang="en-US" sz="3200" b="1" dirty="0">
-                <a:solidFill>
-                  <a:srgbClr val="FFFFFF"/>
-                </a:solidFill>
-                <a:latin typeface="Calibri" panose="020F0502020204030204" pitchFamily="34" charset="0"/>
-                <a:ea typeface="KaiTi" panose="02010609060101010101" pitchFamily="49" charset="-122"/>
-                <a:cs typeface="Calibri" panose="020F0502020204030204" pitchFamily="34" charset="0"/>
-              </a:rPr>
-              <a:t>@</a:t>
-            </a:r>
-            <a:endParaRPr lang="en-US" sz="4000" b="1" dirty="0">
-              <a:solidFill>
-                <a:srgbClr val="FFFFFF"/>
-              </a:solidFill>
-              <a:latin typeface="Calibri" panose="020F0502020204030204" pitchFamily="34" charset="0"/>
-              <a:ea typeface="KaiTi" panose="02010609060101010101" pitchFamily="49" charset="-122"/>
-              <a:cs typeface="Calibri" panose="020F0502020204030204" pitchFamily="34" charset="0"/>
-            </a:endParaRPr>
+              <a:t> </a:t>
+            </a:r>
           </a:p>
           <a:p>
             <a:pPr rtl="0">
@@ -4135,7 +4116,7 @@
               </a:rPr>
               <a:t>@eng_close@</a:t>
             </a:r>
-            <a:endParaRPr lang="en-MY" sz="3200" b="1" dirty="0">
+            <a:endParaRPr lang="en-MY" sz="4000" b="1" dirty="0">
               <a:latin typeface="Calibri" panose="020F0502020204030204" pitchFamily="34" charset="0"/>
               <a:ea typeface="KaiTi" panose="02010609060101010101" pitchFamily="49" charset="-122"/>
               <a:cs typeface="Calibri" panose="020F0502020204030204" pitchFamily="34" charset="0"/>
@@ -4337,7 +4318,7 @@
               </a:rPr>
               <a:t>@eng_close@</a:t>
             </a:r>
-            <a:endParaRPr kumimoji="0" lang="en-MY" sz="3200" b="1" i="0" u="none" strike="noStrike" kern="1200" cap="none" spc="0" normalizeH="0" baseline="0" noProof="0" dirty="0">
+            <a:endParaRPr kumimoji="0" lang="en-MY" sz="4000" b="1" i="0" u="none" strike="noStrike" kern="1200" cap="none" spc="0" normalizeH="0" baseline="0" noProof="0" dirty="0">
               <a:ln>
                 <a:noFill/>
               </a:ln>

</xml_diff>